<commit_message>
Some code refactoring, addition of powerpoint presentation to outline the projects
</commit_message>
<xml_diff>
--- a/generic-single-cell-pipeline.pptx
+++ b/generic-single-cell-pipeline.pptx
@@ -6,6 +6,9 @@
   </p:sldMasterIdLst>
   <p:sldIdLst>
     <p:sldId id="256" r:id="rId2"/>
+    <p:sldId id="257" r:id="rId3"/>
+    <p:sldId id="258" r:id="rId4"/>
+    <p:sldId id="259" r:id="rId5"/>
   </p:sldIdLst>
   <p:sldSz cx="12192000" cy="6858000"/>
   <p:notesSz cx="6858000" cy="9144000"/>
@@ -105,6 +108,26 @@
     </a:lvl9pPr>
   </p:defaultTextStyle>
   <p:extLst>
+    <p:ext uri="{521415D9-36F7-43E2-AB2F-B90AF26B5E84}">
+      <p14:sectionLst xmlns:p14="http://schemas.microsoft.com/office/powerpoint/2010/main">
+        <p14:section name="Default Section" id="{4BD74A0B-3554-46B4-AC16-336F657F793A}">
+          <p14:sldIdLst>
+            <p14:sldId id="256"/>
+          </p14:sldIdLst>
+        </p14:section>
+        <p14:section name="Project 1" id="{9723642D-176A-48E8-A5A7-AA35FA09796B}">
+          <p14:sldIdLst>
+            <p14:sldId id="257"/>
+          </p14:sldIdLst>
+        </p14:section>
+        <p14:section name="Project 2" id="{E1364672-EB38-4D23-80EB-36C91BD8FF2E}">
+          <p14:sldIdLst>
+            <p14:sldId id="258"/>
+            <p14:sldId id="259"/>
+          </p14:sldIdLst>
+        </p14:section>
+      </p14:sectionLst>
+    </p:ext>
     <p:ext uri="{EFAFB233-063F-42B5-8137-9DF3F51BA10A}">
       <p15:sldGuideLst xmlns:p15="http://schemas.microsoft.com/office/powerpoint/2012/main"/>
     </p:ext>
@@ -259,7 +282,7 @@
           <a:p>
             <a:fld id="{1931C711-7819-42EA-841C-24A47BDF6248}" type="datetimeFigureOut">
               <a:rPr lang="en-US" smtClean="0"/>
-              <a:t>6/5/2025</a:t>
+              <a:t>6/25/2025</a:t>
             </a:fld>
             <a:endParaRPr lang="en-US"/>
           </a:p>
@@ -457,7 +480,7 @@
           <a:p>
             <a:fld id="{1931C711-7819-42EA-841C-24A47BDF6248}" type="datetimeFigureOut">
               <a:rPr lang="en-US" smtClean="0"/>
-              <a:t>6/5/2025</a:t>
+              <a:t>6/25/2025</a:t>
             </a:fld>
             <a:endParaRPr lang="en-US"/>
           </a:p>
@@ -665,7 +688,7 @@
           <a:p>
             <a:fld id="{1931C711-7819-42EA-841C-24A47BDF6248}" type="datetimeFigureOut">
               <a:rPr lang="en-US" smtClean="0"/>
-              <a:t>6/5/2025</a:t>
+              <a:t>6/25/2025</a:t>
             </a:fld>
             <a:endParaRPr lang="en-US"/>
           </a:p>
@@ -863,7 +886,7 @@
           <a:p>
             <a:fld id="{1931C711-7819-42EA-841C-24A47BDF6248}" type="datetimeFigureOut">
               <a:rPr lang="en-US" smtClean="0"/>
-              <a:t>6/5/2025</a:t>
+              <a:t>6/25/2025</a:t>
             </a:fld>
             <a:endParaRPr lang="en-US"/>
           </a:p>
@@ -1138,7 +1161,7 @@
           <a:p>
             <a:fld id="{1931C711-7819-42EA-841C-24A47BDF6248}" type="datetimeFigureOut">
               <a:rPr lang="en-US" smtClean="0"/>
-              <a:t>6/5/2025</a:t>
+              <a:t>6/25/2025</a:t>
             </a:fld>
             <a:endParaRPr lang="en-US"/>
           </a:p>
@@ -1403,7 +1426,7 @@
           <a:p>
             <a:fld id="{1931C711-7819-42EA-841C-24A47BDF6248}" type="datetimeFigureOut">
               <a:rPr lang="en-US" smtClean="0"/>
-              <a:t>6/5/2025</a:t>
+              <a:t>6/25/2025</a:t>
             </a:fld>
             <a:endParaRPr lang="en-US"/>
           </a:p>
@@ -1815,7 +1838,7 @@
           <a:p>
             <a:fld id="{1931C711-7819-42EA-841C-24A47BDF6248}" type="datetimeFigureOut">
               <a:rPr lang="en-US" smtClean="0"/>
-              <a:t>6/5/2025</a:t>
+              <a:t>6/25/2025</a:t>
             </a:fld>
             <a:endParaRPr lang="en-US"/>
           </a:p>
@@ -1956,7 +1979,7 @@
           <a:p>
             <a:fld id="{1931C711-7819-42EA-841C-24A47BDF6248}" type="datetimeFigureOut">
               <a:rPr lang="en-US" smtClean="0"/>
-              <a:t>6/5/2025</a:t>
+              <a:t>6/25/2025</a:t>
             </a:fld>
             <a:endParaRPr lang="en-US"/>
           </a:p>
@@ -2069,7 +2092,7 @@
           <a:p>
             <a:fld id="{1931C711-7819-42EA-841C-24A47BDF6248}" type="datetimeFigureOut">
               <a:rPr lang="en-US" smtClean="0"/>
-              <a:t>6/5/2025</a:t>
+              <a:t>6/25/2025</a:t>
             </a:fld>
             <a:endParaRPr lang="en-US"/>
           </a:p>
@@ -2380,7 +2403,7 @@
           <a:p>
             <a:fld id="{1931C711-7819-42EA-841C-24A47BDF6248}" type="datetimeFigureOut">
               <a:rPr lang="en-US" smtClean="0"/>
-              <a:t>6/5/2025</a:t>
+              <a:t>6/25/2025</a:t>
             </a:fld>
             <a:endParaRPr lang="en-US"/>
           </a:p>
@@ -2668,7 +2691,7 @@
           <a:p>
             <a:fld id="{1931C711-7819-42EA-841C-24A47BDF6248}" type="datetimeFigureOut">
               <a:rPr lang="en-US" smtClean="0"/>
-              <a:t>6/5/2025</a:t>
+              <a:t>6/25/2025</a:t>
             </a:fld>
             <a:endParaRPr lang="en-US"/>
           </a:p>
@@ -2909,7 +2932,7 @@
           <a:p>
             <a:fld id="{1931C711-7819-42EA-841C-24A47BDF6248}" type="datetimeFigureOut">
               <a:rPr lang="en-US" smtClean="0"/>
-              <a:t>6/5/2025</a:t>
+              <a:t>6/25/2025</a:t>
             </a:fld>
             <a:endParaRPr lang="en-US"/>
           </a:p>
@@ -3575,14 +3598,7 @@
                 <a:effectLst/>
                 <a:latin typeface="system-ui"/>
               </a:rPr>
-              <a:t>foundation models of single cell RNAseq analysis (look for database with gene </a:t>
-            </a:r>
-            <a:r>
-              <a:rPr lang="en-US" b="0" i="0">
-                <a:effectLst/>
-                <a:latin typeface="system-ui"/>
-              </a:rPr>
-              <a:t>counts)</a:t>
+              <a:t>foundation models of single cell RNAseq analysis (look for database with gene counts)</a:t>
             </a:r>
           </a:p>
           <a:p>
@@ -3604,6 +3620,279 @@
     <p:extLst>
       <p:ext uri="{BB962C8B-B14F-4D97-AF65-F5344CB8AC3E}">
         <p14:creationId xmlns:p14="http://schemas.microsoft.com/office/powerpoint/2010/main" val="3458431584"/>
+      </p:ext>
+    </p:extLst>
+  </p:cSld>
+  <p:clrMapOvr>
+    <a:masterClrMapping/>
+  </p:clrMapOvr>
+</p:sld>
+</file>
+
+<file path=ppt/slides/slide2.xml><?xml version="1.0" encoding="utf-8"?>
+<p:sld xmlns:a="http://schemas.openxmlformats.org/drawingml/2006/main" xmlns:r="http://schemas.openxmlformats.org/officeDocument/2006/relationships" xmlns:p="http://schemas.openxmlformats.org/presentationml/2006/main">
+  <p:cSld>
+    <p:spTree>
+      <p:nvGrpSpPr>
+        <p:cNvPr id="1" name=""/>
+        <p:cNvGrpSpPr/>
+        <p:nvPr/>
+      </p:nvGrpSpPr>
+      <p:grpSpPr>
+        <a:xfrm>
+          <a:off x="0" y="0"/>
+          <a:ext cx="0" cy="0"/>
+          <a:chOff x="0" y="0"/>
+          <a:chExt cx="0" cy="0"/>
+        </a:xfrm>
+      </p:grpSpPr>
+      <p:sp>
+        <p:nvSpPr>
+          <p:cNvPr id="2" name="Title 1">
+            <a:extLst>
+              <a:ext uri="{FF2B5EF4-FFF2-40B4-BE49-F238E27FC236}">
+                <a16:creationId xmlns:a16="http://schemas.microsoft.com/office/drawing/2014/main" id="{E9260332-4584-1487-5D1C-119B940D0F2E}"/>
+              </a:ext>
+            </a:extLst>
+          </p:cNvPr>
+          <p:cNvSpPr>
+            <a:spLocks noGrp="1"/>
+          </p:cNvSpPr>
+          <p:nvPr>
+            <p:ph type="title"/>
+          </p:nvPr>
+        </p:nvSpPr>
+        <p:spPr/>
+        <p:txBody>
+          <a:bodyPr/>
+          <a:lstStyle/>
+          <a:p>
+            <a:r>
+              <a:rPr lang="en-US" dirty="0"/>
+              <a:t>Project 1</a:t>
+            </a:r>
+          </a:p>
+        </p:txBody>
+      </p:sp>
+      <p:sp>
+        <p:nvSpPr>
+          <p:cNvPr id="3" name="Content Placeholder 2">
+            <a:extLst>
+              <a:ext uri="{FF2B5EF4-FFF2-40B4-BE49-F238E27FC236}">
+                <a16:creationId xmlns:a16="http://schemas.microsoft.com/office/drawing/2014/main" id="{ED4C53B0-AB0A-0A17-3788-1DC9AD115763}"/>
+              </a:ext>
+            </a:extLst>
+          </p:cNvPr>
+          <p:cNvSpPr>
+            <a:spLocks noGrp="1"/>
+          </p:cNvSpPr>
+          <p:nvPr>
+            <p:ph idx="1"/>
+          </p:nvPr>
+        </p:nvSpPr>
+        <p:spPr/>
+        <p:txBody>
+          <a:bodyPr/>
+          <a:lstStyle/>
+          <a:p>
+            <a:r>
+              <a:rPr lang="en-US" dirty="0">
+                <a:latin typeface="system-ui"/>
+              </a:rPr>
+              <a:t>Hypothesis: Genes that are physically close to one another in the genome and converge transcriptionally will switch off one gene at the single-cell resolution to avoid transcription from one gene into the other</a:t>
+            </a:r>
+          </a:p>
+          <a:p>
+            <a:endParaRPr lang="en-US" dirty="0">
+              <a:latin typeface="system-ui"/>
+            </a:endParaRPr>
+          </a:p>
+        </p:txBody>
+      </p:sp>
+    </p:spTree>
+    <p:extLst>
+      <p:ext uri="{BB962C8B-B14F-4D97-AF65-F5344CB8AC3E}">
+        <p14:creationId xmlns:p14="http://schemas.microsoft.com/office/powerpoint/2010/main" val="2415231926"/>
+      </p:ext>
+    </p:extLst>
+  </p:cSld>
+  <p:clrMapOvr>
+    <a:masterClrMapping/>
+  </p:clrMapOvr>
+</p:sld>
+</file>
+
+<file path=ppt/slides/slide3.xml><?xml version="1.0" encoding="utf-8"?>
+<p:sld xmlns:a="http://schemas.openxmlformats.org/drawingml/2006/main" xmlns:r="http://schemas.openxmlformats.org/officeDocument/2006/relationships" xmlns:p="http://schemas.openxmlformats.org/presentationml/2006/main">
+  <p:cSld>
+    <p:spTree>
+      <p:nvGrpSpPr>
+        <p:cNvPr id="1" name=""/>
+        <p:cNvGrpSpPr/>
+        <p:nvPr/>
+      </p:nvGrpSpPr>
+      <p:grpSpPr>
+        <a:xfrm>
+          <a:off x="0" y="0"/>
+          <a:ext cx="0" cy="0"/>
+          <a:chOff x="0" y="0"/>
+          <a:chExt cx="0" cy="0"/>
+        </a:xfrm>
+      </p:grpSpPr>
+      <p:sp>
+        <p:nvSpPr>
+          <p:cNvPr id="2" name="Title 1">
+            <a:extLst>
+              <a:ext uri="{FF2B5EF4-FFF2-40B4-BE49-F238E27FC236}">
+                <a16:creationId xmlns:a16="http://schemas.microsoft.com/office/drawing/2014/main" id="{FBEB55BD-A5B0-1E6D-DBA1-46E1C1040351}"/>
+              </a:ext>
+            </a:extLst>
+          </p:cNvPr>
+          <p:cNvSpPr>
+            <a:spLocks noGrp="1"/>
+          </p:cNvSpPr>
+          <p:nvPr>
+            <p:ph type="title"/>
+          </p:nvPr>
+        </p:nvSpPr>
+        <p:spPr/>
+        <p:txBody>
+          <a:bodyPr/>
+          <a:lstStyle/>
+          <a:p>
+            <a:r>
+              <a:rPr lang="en-US" dirty="0"/>
+              <a:t>Project 2</a:t>
+            </a:r>
+          </a:p>
+        </p:txBody>
+      </p:sp>
+      <p:sp>
+        <p:nvSpPr>
+          <p:cNvPr id="3" name="Content Placeholder 2">
+            <a:extLst>
+              <a:ext uri="{FF2B5EF4-FFF2-40B4-BE49-F238E27FC236}">
+                <a16:creationId xmlns:a16="http://schemas.microsoft.com/office/drawing/2014/main" id="{2C4CD10D-9E56-90B2-0B42-01B8C2D0ACB6}"/>
+              </a:ext>
+            </a:extLst>
+          </p:cNvPr>
+          <p:cNvSpPr>
+            <a:spLocks noGrp="1"/>
+          </p:cNvSpPr>
+          <p:nvPr>
+            <p:ph idx="1"/>
+          </p:nvPr>
+        </p:nvSpPr>
+        <p:spPr/>
+        <p:txBody>
+          <a:bodyPr/>
+          <a:lstStyle/>
+          <a:p>
+            <a:r>
+              <a:rPr lang="en-US" dirty="0"/>
+              <a:t>Hypothesis: Genes that converge physically in the genome will use alternative polyA sites when both are expressed so as to not interfere with one </a:t>
+            </a:r>
+            <a:r>
+              <a:rPr lang="en-US"/>
+              <a:t>another transcriptionally</a:t>
+            </a:r>
+            <a:endParaRPr lang="en-US" dirty="0"/>
+          </a:p>
+        </p:txBody>
+      </p:sp>
+    </p:spTree>
+    <p:extLst>
+      <p:ext uri="{BB962C8B-B14F-4D97-AF65-F5344CB8AC3E}">
+        <p14:creationId xmlns:p14="http://schemas.microsoft.com/office/powerpoint/2010/main" val="1168486451"/>
+      </p:ext>
+    </p:extLst>
+  </p:cSld>
+  <p:clrMapOvr>
+    <a:masterClrMapping/>
+  </p:clrMapOvr>
+</p:sld>
+</file>
+
+<file path=ppt/slides/slide4.xml><?xml version="1.0" encoding="utf-8"?>
+<p:sld xmlns:a="http://schemas.openxmlformats.org/drawingml/2006/main" xmlns:r="http://schemas.openxmlformats.org/officeDocument/2006/relationships" xmlns:p="http://schemas.openxmlformats.org/presentationml/2006/main">
+  <p:cSld>
+    <p:spTree>
+      <p:nvGrpSpPr>
+        <p:cNvPr id="1" name="">
+          <a:extLst>
+            <a:ext uri="{FF2B5EF4-FFF2-40B4-BE49-F238E27FC236}">
+              <a16:creationId xmlns:a16="http://schemas.microsoft.com/office/drawing/2014/main" id="{C9F27DAD-2B95-BAF1-953F-2D77D60B8AD9}"/>
+            </a:ext>
+          </a:extLst>
+        </p:cNvPr>
+        <p:cNvGrpSpPr/>
+        <p:nvPr/>
+      </p:nvGrpSpPr>
+      <p:grpSpPr>
+        <a:xfrm>
+          <a:off x="0" y="0"/>
+          <a:ext cx="0" cy="0"/>
+          <a:chOff x="0" y="0"/>
+          <a:chExt cx="0" cy="0"/>
+        </a:xfrm>
+      </p:grpSpPr>
+      <p:sp>
+        <p:nvSpPr>
+          <p:cNvPr id="2" name="Title 1">
+            <a:extLst>
+              <a:ext uri="{FF2B5EF4-FFF2-40B4-BE49-F238E27FC236}">
+                <a16:creationId xmlns:a16="http://schemas.microsoft.com/office/drawing/2014/main" id="{76A701DF-FEF6-116B-E65D-21FC587CF07D}"/>
+              </a:ext>
+            </a:extLst>
+          </p:cNvPr>
+          <p:cNvSpPr>
+            <a:spLocks noGrp="1"/>
+          </p:cNvSpPr>
+          <p:nvPr>
+            <p:ph type="title"/>
+          </p:nvPr>
+        </p:nvSpPr>
+        <p:spPr/>
+        <p:txBody>
+          <a:bodyPr/>
+          <a:lstStyle/>
+          <a:p>
+            <a:r>
+              <a:rPr lang="en-US" dirty="0"/>
+              <a:t>Project 3</a:t>
+            </a:r>
+          </a:p>
+        </p:txBody>
+      </p:sp>
+      <p:sp>
+        <p:nvSpPr>
+          <p:cNvPr id="3" name="Content Placeholder 2">
+            <a:extLst>
+              <a:ext uri="{FF2B5EF4-FFF2-40B4-BE49-F238E27FC236}">
+                <a16:creationId xmlns:a16="http://schemas.microsoft.com/office/drawing/2014/main" id="{A648D3CC-5CA2-80DA-0533-0C2909F60531}"/>
+              </a:ext>
+            </a:extLst>
+          </p:cNvPr>
+          <p:cNvSpPr>
+            <a:spLocks noGrp="1"/>
+          </p:cNvSpPr>
+          <p:nvPr>
+            <p:ph idx="1"/>
+          </p:nvPr>
+        </p:nvSpPr>
+        <p:spPr/>
+        <p:txBody>
+          <a:bodyPr/>
+          <a:lstStyle/>
+          <a:p>
+            <a:endParaRPr lang="en-US"/>
+          </a:p>
+        </p:txBody>
+      </p:sp>
+    </p:spTree>
+    <p:extLst>
+      <p:ext uri="{BB962C8B-B14F-4D97-AF65-F5344CB8AC3E}">
+        <p14:creationId xmlns:p14="http://schemas.microsoft.com/office/powerpoint/2010/main" val="2036125157"/>
       </p:ext>
     </p:extLst>
   </p:cSld>

</xml_diff>

<commit_message>
some code refactoring and updated detect converging genes function to allow for overlapping or non-overlapping pairs
</commit_message>
<xml_diff>
--- a/generic-single-cell-pipeline.pptx
+++ b/generic-single-cell-pipeline.pptx
@@ -9,6 +9,7 @@
     <p:sldId id="257" r:id="rId3"/>
     <p:sldId id="258" r:id="rId4"/>
     <p:sldId id="259" r:id="rId5"/>
+    <p:sldId id="260" r:id="rId6"/>
   </p:sldIdLst>
   <p:sldSz cx="12192000" cy="6858000"/>
   <p:notesSz cx="6858000" cy="9144000"/>
@@ -124,6 +125,7 @@
           <p14:sldIdLst>
             <p14:sldId id="258"/>
             <p14:sldId id="259"/>
+            <p14:sldId id="260"/>
           </p14:sldIdLst>
         </p14:section>
       </p14:sectionLst>
@@ -3790,13 +3792,8 @@
           <a:p>
             <a:r>
               <a:rPr lang="en-US" dirty="0"/>
-              <a:t>Hypothesis: Genes that converge physically in the genome will use alternative polyA sites when both are expressed so as to not interfere with one </a:t>
-            </a:r>
-            <a:r>
-              <a:rPr lang="en-US"/>
-              <a:t>another transcriptionally</a:t>
-            </a:r>
-            <a:endParaRPr lang="en-US" dirty="0"/>
+              <a:t>Hypothesis: Genes that converge physically in the genome will use alternative polyA sites when both are expressed so as to not interfere with one another transcriptionally</a:t>
+            </a:r>
           </a:p>
         </p:txBody>
       </p:sp>
@@ -3885,7 +3882,10 @@
           <a:bodyPr/>
           <a:lstStyle/>
           <a:p>
-            <a:endParaRPr lang="en-US"/>
+            <a:r>
+              <a:rPr lang="en-US" dirty="0"/>
+              <a:t>Hypothesis: Usage of alternative polyA sites or alternate mechanisms to prevent converging genes from transcribing into each other will function in a cell-type manner depending on the sensitivity to dsRNA detection in a given cell type.</a:t>
+            </a:r>
           </a:p>
         </p:txBody>
       </p:sp>
@@ -3893,6 +3893,104 @@
     <p:extLst>
       <p:ext uri="{BB962C8B-B14F-4D97-AF65-F5344CB8AC3E}">
         <p14:creationId xmlns:p14="http://schemas.microsoft.com/office/powerpoint/2010/main" val="2036125157"/>
+      </p:ext>
+    </p:extLst>
+  </p:cSld>
+  <p:clrMapOvr>
+    <a:masterClrMapping/>
+  </p:clrMapOvr>
+</p:sld>
+</file>
+
+<file path=ppt/slides/slide5.xml><?xml version="1.0" encoding="utf-8"?>
+<p:sld xmlns:a="http://schemas.openxmlformats.org/drawingml/2006/main" xmlns:r="http://schemas.openxmlformats.org/officeDocument/2006/relationships" xmlns:p="http://schemas.openxmlformats.org/presentationml/2006/main">
+  <p:cSld>
+    <p:spTree>
+      <p:nvGrpSpPr>
+        <p:cNvPr id="1" name=""/>
+        <p:cNvGrpSpPr/>
+        <p:nvPr/>
+      </p:nvGrpSpPr>
+      <p:grpSpPr>
+        <a:xfrm>
+          <a:off x="0" y="0"/>
+          <a:ext cx="0" cy="0"/>
+          <a:chOff x="0" y="0"/>
+          <a:chExt cx="0" cy="0"/>
+        </a:xfrm>
+      </p:grpSpPr>
+      <p:sp>
+        <p:nvSpPr>
+          <p:cNvPr id="2" name="Title 1">
+            <a:extLst>
+              <a:ext uri="{FF2B5EF4-FFF2-40B4-BE49-F238E27FC236}">
+                <a16:creationId xmlns:a16="http://schemas.microsoft.com/office/drawing/2014/main" id="{E1B25662-0C02-8C62-FCA7-8F0B96794041}"/>
+              </a:ext>
+            </a:extLst>
+          </p:cNvPr>
+          <p:cNvSpPr>
+            <a:spLocks noGrp="1"/>
+          </p:cNvSpPr>
+          <p:nvPr>
+            <p:ph type="title"/>
+          </p:nvPr>
+        </p:nvSpPr>
+        <p:spPr/>
+        <p:txBody>
+          <a:bodyPr/>
+          <a:lstStyle/>
+          <a:p>
+            <a:br>
+              <a:rPr lang="en-US" dirty="0"/>
+            </a:br>
+            <a:r>
+              <a:rPr lang="en-US" dirty="0"/>
+              <a:t>Resources</a:t>
+            </a:r>
+          </a:p>
+        </p:txBody>
+      </p:sp>
+      <p:sp>
+        <p:nvSpPr>
+          <p:cNvPr id="3" name="Content Placeholder 2">
+            <a:extLst>
+              <a:ext uri="{FF2B5EF4-FFF2-40B4-BE49-F238E27FC236}">
+                <a16:creationId xmlns:a16="http://schemas.microsoft.com/office/drawing/2014/main" id="{01BF1F87-AD32-3241-298D-16754585D5CA}"/>
+              </a:ext>
+            </a:extLst>
+          </p:cNvPr>
+          <p:cNvSpPr>
+            <a:spLocks noGrp="1"/>
+          </p:cNvSpPr>
+          <p:nvPr>
+            <p:ph idx="1"/>
+          </p:nvPr>
+        </p:nvSpPr>
+        <p:spPr/>
+        <p:txBody>
+          <a:bodyPr/>
+          <a:lstStyle/>
+          <a:p>
+            <a:r>
+              <a:rPr lang="en-US" dirty="0">
+                <a:hlinkClick r:id="rId2"/>
+              </a:rPr>
+              <a:t>https://chanzuckerberg.github.io/cellxgene-census/cellxgene_census_docsite_FAQ.html</a:t>
+            </a:r>
+            <a:endParaRPr lang="en-US" dirty="0"/>
+          </a:p>
+          <a:p>
+            <a:r>
+              <a:rPr lang="en-US" dirty="0"/>
+              <a:t>https://www.nature.com/articles/s41592-024-02201-0</a:t>
+            </a:r>
+          </a:p>
+        </p:txBody>
+      </p:sp>
+    </p:spTree>
+    <p:extLst>
+      <p:ext uri="{BB962C8B-B14F-4D97-AF65-F5344CB8AC3E}">
+        <p14:creationId xmlns:p14="http://schemas.microsoft.com/office/powerpoint/2010/main" val="3226872689"/>
       </p:ext>
     </p:extLst>
   </p:cSld>

</xml_diff>